<commit_message>
ajout page simple post
</commit_message>
<xml_diff>
--- a/conception/Arborescence/Résumé_arborescence.pptx
+++ b/conception/Arborescence/Résumé_arborescence.pptx
@@ -3845,36 +3845,42 @@
             </a:r>
           </a:p>
           <a:p>
-            <a:endParaRPr lang="fr-FR" sz="1100" dirty="0">
-              <a:ln w="0"/>
-              <a:solidFill>
-                <a:schemeClr val="accent1"/>
-              </a:solidFill>
-              <a:effectLst>
-                <a:outerShdw blurRad="38100" dist="25400" dir="5400000" algn="ctr" rotWithShape="0">
-                  <a:srgbClr val="6E747A">
-                    <a:alpha val="43000"/>
-                  </a:srgbClr>
-                </a:outerShdw>
-              </a:effectLst>
-              <a:latin typeface="Trebuchet MS" panose="020B0603020202020204" pitchFamily="34" charset="0"/>
-            </a:endParaRPr>
-          </a:p>
-          <a:p>
-            <a:endParaRPr lang="fr-FR" sz="1100" dirty="0">
-              <a:ln w="0"/>
-              <a:solidFill>
-                <a:schemeClr val="accent1"/>
-              </a:solidFill>
-              <a:effectLst>
-                <a:outerShdw blurRad="38100" dist="25400" dir="5400000" algn="ctr" rotWithShape="0">
-                  <a:srgbClr val="6E747A">
-                    <a:alpha val="43000"/>
-                  </a:srgbClr>
-                </a:outerShdw>
-              </a:effectLst>
-              <a:latin typeface="Trebuchet MS" panose="020B0603020202020204" pitchFamily="34" charset="0"/>
-            </a:endParaRPr>
+            <a:r>
+              <a:rPr lang="fr-FR" sz="1100" dirty="0">
+                <a:ln w="0"/>
+                <a:solidFill>
+                  <a:schemeClr val="accent1"/>
+                </a:solidFill>
+                <a:effectLst>
+                  <a:outerShdw blurRad="38100" dist="25400" dir="5400000" algn="ctr" rotWithShape="0">
+                    <a:srgbClr val="6E747A">
+                      <a:alpha val="43000"/>
+                    </a:srgbClr>
+                  </a:outerShdw>
+                </a:effectLst>
+                <a:latin typeface="Trebuchet MS" panose="020B0603020202020204" pitchFamily="34" charset="0"/>
+              </a:rPr>
+              <a:t>Dans ce dossier se trouvent les informations permettant de recréer le projet.</a:t>
+            </a:r>
+          </a:p>
+          <a:p>
+            <a:r>
+              <a:rPr lang="fr-FR" sz="1100" dirty="0">
+                <a:ln w="0"/>
+                <a:solidFill>
+                  <a:schemeClr val="accent1"/>
+                </a:solidFill>
+                <a:effectLst>
+                  <a:outerShdw blurRad="38100" dist="25400" dir="5400000" algn="ctr" rotWithShape="0">
+                    <a:srgbClr val="6E747A">
+                      <a:alpha val="43000"/>
+                    </a:srgbClr>
+                  </a:outerShdw>
+                </a:effectLst>
+                <a:latin typeface="Trebuchet MS" panose="020B0603020202020204" pitchFamily="34" charset="0"/>
+              </a:rPr>
+              <a:t>Tables créées à la suite de la création des entités avec Doctrine.</a:t>
+            </a:r>
           </a:p>
           <a:p>
             <a:endParaRPr lang="fr-FR" sz="1100" dirty="0">
@@ -3960,20 +3966,23 @@
             </a:r>
           </a:p>
           <a:p>
-            <a:endParaRPr lang="fr-FR" sz="1100" dirty="0">
-              <a:ln w="0"/>
-              <a:solidFill>
-                <a:schemeClr val="accent1"/>
-              </a:solidFill>
-              <a:effectLst>
-                <a:outerShdw blurRad="38100" dist="25400" dir="5400000" algn="ctr" rotWithShape="0">
-                  <a:srgbClr val="6E747A">
-                    <a:alpha val="43000"/>
-                  </a:srgbClr>
-                </a:outerShdw>
-              </a:effectLst>
-              <a:latin typeface="Trebuchet MS" panose="020B0603020202020204" pitchFamily="34" charset="0"/>
-            </a:endParaRPr>
+            <a:r>
+              <a:rPr lang="fr-FR" sz="1100" dirty="0">
+                <a:ln w="0"/>
+                <a:solidFill>
+                  <a:schemeClr val="accent1"/>
+                </a:solidFill>
+                <a:effectLst>
+                  <a:outerShdw blurRad="38100" dist="25400" dir="5400000" algn="ctr" rotWithShape="0">
+                    <a:srgbClr val="6E747A">
+                      <a:alpha val="43000"/>
+                    </a:srgbClr>
+                  </a:outerShdw>
+                </a:effectLst>
+                <a:latin typeface="Trebuchet MS" panose="020B0603020202020204" pitchFamily="34" charset="0"/>
+              </a:rPr>
+              <a:t>Dans ce dossier se trouvent les ressources pour afficher le front end.</a:t>
+            </a:r>
           </a:p>
           <a:p>
             <a:endParaRPr lang="fr-FR" sz="1100" dirty="0">
@@ -4109,20 +4118,23 @@
             </a:r>
           </a:p>
           <a:p>
-            <a:endParaRPr lang="fr-FR" sz="1100" dirty="0">
-              <a:ln w="0"/>
-              <a:solidFill>
-                <a:schemeClr val="accent1"/>
-              </a:solidFill>
-              <a:effectLst>
-                <a:outerShdw blurRad="38100" dist="25400" dir="5400000" algn="ctr" rotWithShape="0">
-                  <a:srgbClr val="6E747A">
-                    <a:alpha val="43000"/>
-                  </a:srgbClr>
-                </a:outerShdw>
-              </a:effectLst>
-              <a:latin typeface="Trebuchet MS" panose="020B0603020202020204" pitchFamily="34" charset="0"/>
-            </a:endParaRPr>
+            <a:r>
+              <a:rPr lang="fr-FR" sz="1100" dirty="0">
+                <a:ln w="0"/>
+                <a:solidFill>
+                  <a:schemeClr val="accent1"/>
+                </a:solidFill>
+                <a:effectLst>
+                  <a:outerShdw blurRad="38100" dist="25400" dir="5400000" algn="ctr" rotWithShape="0">
+                    <a:srgbClr val="6E747A">
+                      <a:alpha val="43000"/>
+                    </a:srgbClr>
+                  </a:outerShdw>
+                </a:effectLst>
+                <a:latin typeface="Trebuchet MS" panose="020B0603020202020204" pitchFamily="34" charset="0"/>
+              </a:rPr>
+              <a:t>Dans ce dossier se trouvent les routes.</a:t>
+            </a:r>
           </a:p>
           <a:p>
             <a:endParaRPr lang="fr-FR" sz="1100" dirty="0">
@@ -4261,20 +4273,57 @@
             </a:r>
           </a:p>
           <a:p>
-            <a:endParaRPr lang="fr-FR" sz="1100" dirty="0">
-              <a:ln w="0"/>
-              <a:solidFill>
-                <a:srgbClr val="7030A0"/>
-              </a:solidFill>
-              <a:effectLst>
-                <a:outerShdw blurRad="38100" dist="25400" dir="5400000" algn="ctr" rotWithShape="0">
-                  <a:srgbClr val="6E747A">
-                    <a:alpha val="43000"/>
-                  </a:srgbClr>
-                </a:outerShdw>
-              </a:effectLst>
-              <a:latin typeface="Trebuchet MS" panose="020B0603020202020204" pitchFamily="34" charset="0"/>
-            </a:endParaRPr>
+            <a:r>
+              <a:rPr lang="fr-FR" sz="1100" dirty="0">
+                <a:ln w="0"/>
+                <a:solidFill>
+                  <a:srgbClr val="7030A0"/>
+                </a:solidFill>
+                <a:effectLst>
+                  <a:outerShdw blurRad="38100" dist="25400" dir="5400000" algn="ctr" rotWithShape="0">
+                    <a:srgbClr val="6E747A">
+                      <a:alpha val="43000"/>
+                    </a:srgbClr>
+                  </a:outerShdw>
+                </a:effectLst>
+                <a:latin typeface="Trebuchet MS" panose="020B0603020202020204" pitchFamily="34" charset="0"/>
+              </a:rPr>
+              <a:t>Dans ce dossier se trouvent les Modèles (</a:t>
+            </a:r>
+            <a:r>
+              <a:rPr lang="fr-FR" sz="1100" dirty="0" err="1">
+                <a:ln w="0"/>
+                <a:solidFill>
+                  <a:srgbClr val="7030A0"/>
+                </a:solidFill>
+                <a:effectLst>
+                  <a:outerShdw blurRad="38100" dist="25400" dir="5400000" algn="ctr" rotWithShape="0">
+                    <a:srgbClr val="6E747A">
+                      <a:alpha val="43000"/>
+                    </a:srgbClr>
+                  </a:outerShdw>
+                </a:effectLst>
+                <a:latin typeface="Trebuchet MS" panose="020B0603020202020204" pitchFamily="34" charset="0"/>
+              </a:rPr>
+              <a:t>Layout</a:t>
+            </a:r>
+            <a:r>
+              <a:rPr lang="fr-FR" sz="1100" dirty="0">
+                <a:ln w="0"/>
+                <a:solidFill>
+                  <a:srgbClr val="7030A0"/>
+                </a:solidFill>
+                <a:effectLst>
+                  <a:outerShdw blurRad="38100" dist="25400" dir="5400000" algn="ctr" rotWithShape="0">
+                    <a:srgbClr val="6E747A">
+                      <a:alpha val="43000"/>
+                    </a:srgbClr>
+                  </a:outerShdw>
+                </a:effectLst>
+                <a:latin typeface="Trebuchet MS" panose="020B0603020202020204" pitchFamily="34" charset="0"/>
+              </a:rPr>
+              <a:t>).</a:t>
+            </a:r>
           </a:p>
           <a:p>
             <a:endParaRPr lang="fr-FR" sz="1100" dirty="0">
@@ -4422,23 +4471,66 @@
             </a:r>
           </a:p>
           <a:p>
-            <a:endParaRPr lang="fr-FR" sz="1100" dirty="0">
-              <a:ln w="0"/>
-              <a:solidFill>
-                <a:schemeClr val="tx1">
-                  <a:lumMod val="95000"/>
-                  <a:lumOff val="5000"/>
-                </a:schemeClr>
-              </a:solidFill>
-              <a:effectLst>
-                <a:outerShdw blurRad="38100" dist="25400" dir="5400000" algn="ctr" rotWithShape="0">
-                  <a:srgbClr val="6E747A">
-                    <a:alpha val="43000"/>
-                  </a:srgbClr>
-                </a:outerShdw>
-              </a:effectLst>
-              <a:latin typeface="Trebuchet MS" panose="020B0603020202020204" pitchFamily="34" charset="0"/>
-            </a:endParaRPr>
+            <a:r>
+              <a:rPr lang="fr-FR" sz="1100" dirty="0">
+                <a:ln w="0"/>
+                <a:solidFill>
+                  <a:schemeClr val="tx1">
+                    <a:lumMod val="95000"/>
+                    <a:lumOff val="5000"/>
+                  </a:schemeClr>
+                </a:solidFill>
+                <a:effectLst>
+                  <a:outerShdw blurRad="38100" dist="25400" dir="5400000" algn="ctr" rotWithShape="0">
+                    <a:srgbClr val="6E747A">
+                      <a:alpha val="43000"/>
+                    </a:srgbClr>
+                  </a:outerShdw>
+                </a:effectLst>
+                <a:latin typeface="Trebuchet MS" panose="020B0603020202020204" pitchFamily="34" charset="0"/>
+              </a:rPr>
+              <a:t>Dans ce dossier se trouvent les Vues en HTML qui sont envoyées, une fois renseignées, vers le </a:t>
+            </a:r>
+            <a:r>
+              <a:rPr lang="fr-FR" sz="1100" dirty="0" err="1">
+                <a:ln w="0"/>
+                <a:solidFill>
+                  <a:schemeClr val="tx1">
+                    <a:lumMod val="95000"/>
+                    <a:lumOff val="5000"/>
+                  </a:schemeClr>
+                </a:solidFill>
+                <a:effectLst>
+                  <a:outerShdw blurRad="38100" dist="25400" dir="5400000" algn="ctr" rotWithShape="0">
+                    <a:srgbClr val="6E747A">
+                      <a:alpha val="43000"/>
+                    </a:srgbClr>
+                  </a:outerShdw>
+                </a:effectLst>
+                <a:latin typeface="Trebuchet MS" panose="020B0603020202020204" pitchFamily="34" charset="0"/>
+              </a:rPr>
+              <a:t>front-end</a:t>
+            </a:r>
+            <a:r>
+              <a:rPr lang="fr-FR" sz="1100" dirty="0">
+                <a:ln w="0"/>
+                <a:solidFill>
+                  <a:schemeClr val="tx1">
+                    <a:lumMod val="95000"/>
+                    <a:lumOff val="5000"/>
+                  </a:schemeClr>
+                </a:solidFill>
+                <a:effectLst>
+                  <a:outerShdw blurRad="38100" dist="25400" dir="5400000" algn="ctr" rotWithShape="0">
+                    <a:srgbClr val="6E747A">
+                      <a:alpha val="43000"/>
+                    </a:srgbClr>
+                  </a:outerShdw>
+                </a:effectLst>
+                <a:latin typeface="Trebuchet MS" panose="020B0603020202020204" pitchFamily="34" charset="0"/>
+              </a:rPr>
+              <a:t>.</a:t>
+            </a:r>
           </a:p>
           <a:p>
             <a:endParaRPr lang="fr-FR" sz="1100" dirty="0">

</xml_diff>